<commit_message>
ppt & shiny update
</commit_message>
<xml_diff>
--- a/R Project.pptx
+++ b/R Project.pptx
@@ -11,16 +11,15 @@
     <p:sldId id="259" r:id="rId5"/>
     <p:sldId id="260" r:id="rId6"/>
     <p:sldId id="261" r:id="rId7"/>
-    <p:sldId id="262" r:id="rId8"/>
+    <p:sldId id="273" r:id="rId8"/>
     <p:sldId id="271" r:id="rId9"/>
     <p:sldId id="270" r:id="rId10"/>
     <p:sldId id="263" r:id="rId11"/>
     <p:sldId id="264" r:id="rId12"/>
     <p:sldId id="265" r:id="rId13"/>
-    <p:sldId id="266" r:id="rId14"/>
-    <p:sldId id="267" r:id="rId15"/>
-    <p:sldId id="268" r:id="rId16"/>
-    <p:sldId id="272" r:id="rId17"/>
+    <p:sldId id="267" r:id="rId14"/>
+    <p:sldId id="268" r:id="rId15"/>
+    <p:sldId id="272" r:id="rId16"/>
   </p:sldIdLst>
   <p:sldSz cx="12192000" cy="6858000"/>
   <p:notesSz cx="6858000" cy="9144000"/>
@@ -132,7 +131,7 @@
   <pc:docChgLst>
     <pc:chgData name="Jungu Kang" userId="c6323cfc4e9685da" providerId="LiveId" clId="{CF939628-056A-40A5-BD9E-5B1FD977C697}"/>
     <pc:docChg chg="undo redo custSel addSld delSld modSld">
-      <pc:chgData name="Jungu Kang" userId="c6323cfc4e9685da" providerId="LiveId" clId="{CF939628-056A-40A5-BD9E-5B1FD977C697}" dt="2022-01-14T04:43:49.701" v="2784" actId="15"/>
+      <pc:chgData name="Jungu Kang" userId="c6323cfc4e9685da" providerId="LiveId" clId="{CF939628-056A-40A5-BD9E-5B1FD977C697}" dt="2022-01-18T05:03:41.600" v="3847" actId="20577"/>
       <pc:docMkLst>
         <pc:docMk/>
       </pc:docMkLst>
@@ -160,7 +159,7 @@
         </pc:spChg>
       </pc:sldChg>
       <pc:sldChg chg="modSp new mod">
-        <pc:chgData name="Jungu Kang" userId="c6323cfc4e9685da" providerId="LiveId" clId="{CF939628-056A-40A5-BD9E-5B1FD977C697}" dt="2022-01-14T03:42:33.846" v="1951" actId="20577"/>
+        <pc:chgData name="Jungu Kang" userId="c6323cfc4e9685da" providerId="LiveId" clId="{CF939628-056A-40A5-BD9E-5B1FD977C697}" dt="2022-01-18T04:17:50.446" v="2873" actId="20577"/>
         <pc:sldMkLst>
           <pc:docMk/>
           <pc:sldMk cId="427858035" sldId="257"/>
@@ -174,7 +173,7 @@
           </ac:spMkLst>
         </pc:spChg>
         <pc:spChg chg="mod">
-          <ac:chgData name="Jungu Kang" userId="c6323cfc4e9685da" providerId="LiveId" clId="{CF939628-056A-40A5-BD9E-5B1FD977C697}" dt="2022-01-14T03:42:33.846" v="1951" actId="20577"/>
+          <ac:chgData name="Jungu Kang" userId="c6323cfc4e9685da" providerId="LiveId" clId="{CF939628-056A-40A5-BD9E-5B1FD977C697}" dt="2022-01-18T04:17:50.446" v="2873" actId="20577"/>
           <ac:spMkLst>
             <pc:docMk/>
             <pc:sldMk cId="427858035" sldId="257"/>
@@ -214,7 +213,7 @@
         </pc:picChg>
       </pc:sldChg>
       <pc:sldChg chg="addSp delSp modSp new mod">
-        <pc:chgData name="Jungu Kang" userId="c6323cfc4e9685da" providerId="LiveId" clId="{CF939628-056A-40A5-BD9E-5B1FD977C697}" dt="2022-01-14T04:43:49.701" v="2784" actId="15"/>
+        <pc:chgData name="Jungu Kang" userId="c6323cfc4e9685da" providerId="LiveId" clId="{CF939628-056A-40A5-BD9E-5B1FD977C697}" dt="2022-01-18T04:19:48.453" v="2941" actId="20577"/>
         <pc:sldMkLst>
           <pc:docMk/>
           <pc:sldMk cId="2345454894" sldId="259"/>
@@ -244,7 +243,7 @@
           </ac:spMkLst>
         </pc:spChg>
         <pc:spChg chg="add mod">
-          <ac:chgData name="Jungu Kang" userId="c6323cfc4e9685da" providerId="LiveId" clId="{CF939628-056A-40A5-BD9E-5B1FD977C697}" dt="2022-01-14T04:43:49.701" v="2784" actId="15"/>
+          <ac:chgData name="Jungu Kang" userId="c6323cfc4e9685da" providerId="LiveId" clId="{CF939628-056A-40A5-BD9E-5B1FD977C697}" dt="2022-01-18T04:19:48.453" v="2941" actId="20577"/>
           <ac:spMkLst>
             <pc:docMk/>
             <pc:sldMk cId="2345454894" sldId="259"/>
@@ -332,7 +331,7 @@
         </pc:picChg>
       </pc:sldChg>
       <pc:sldChg chg="addSp delSp modSp new mod">
-        <pc:chgData name="Jungu Kang" userId="c6323cfc4e9685da" providerId="LiveId" clId="{CF939628-056A-40A5-BD9E-5B1FD977C697}" dt="2022-01-14T03:49:58.900" v="2067" actId="1076"/>
+        <pc:chgData name="Jungu Kang" userId="c6323cfc4e9685da" providerId="LiveId" clId="{CF939628-056A-40A5-BD9E-5B1FD977C697}" dt="2022-01-18T04:20:40.460" v="3046" actId="1036"/>
         <pc:sldMkLst>
           <pc:docMk/>
           <pc:sldMk cId="929015462" sldId="261"/>
@@ -370,7 +369,7 @@
           </ac:spMkLst>
         </pc:spChg>
         <pc:spChg chg="add mod ord">
-          <ac:chgData name="Jungu Kang" userId="c6323cfc4e9685da" providerId="LiveId" clId="{CF939628-056A-40A5-BD9E-5B1FD977C697}" dt="2022-01-12T09:20:00.484" v="838" actId="20577"/>
+          <ac:chgData name="Jungu Kang" userId="c6323cfc4e9685da" providerId="LiveId" clId="{CF939628-056A-40A5-BD9E-5B1FD977C697}" dt="2022-01-18T04:20:30.972" v="3034" actId="20577"/>
           <ac:spMkLst>
             <pc:docMk/>
             <pc:sldMk cId="929015462" sldId="261"/>
@@ -378,7 +377,7 @@
           </ac:spMkLst>
         </pc:spChg>
         <pc:picChg chg="add mod">
-          <ac:chgData name="Jungu Kang" userId="c6323cfc4e9685da" providerId="LiveId" clId="{CF939628-056A-40A5-BD9E-5B1FD977C697}" dt="2022-01-14T03:49:41.745" v="2063" actId="1076"/>
+          <ac:chgData name="Jungu Kang" userId="c6323cfc4e9685da" providerId="LiveId" clId="{CF939628-056A-40A5-BD9E-5B1FD977C697}" dt="2022-01-18T04:20:40.460" v="3046" actId="1036"/>
           <ac:picMkLst>
             <pc:docMk/>
             <pc:sldMk cId="929015462" sldId="261"/>
@@ -386,7 +385,7 @@
           </ac:picMkLst>
         </pc:picChg>
         <pc:picChg chg="add mod">
-          <ac:chgData name="Jungu Kang" userId="c6323cfc4e9685da" providerId="LiveId" clId="{CF939628-056A-40A5-BD9E-5B1FD977C697}" dt="2022-01-14T03:49:36.423" v="2062" actId="1076"/>
+          <ac:chgData name="Jungu Kang" userId="c6323cfc4e9685da" providerId="LiveId" clId="{CF939628-056A-40A5-BD9E-5B1FD977C697}" dt="2022-01-18T04:20:40.460" v="3046" actId="1036"/>
           <ac:picMkLst>
             <pc:docMk/>
             <pc:sldMk cId="929015462" sldId="261"/>
@@ -402,7 +401,7 @@
           </ac:picMkLst>
         </pc:picChg>
         <pc:picChg chg="add mod">
-          <ac:chgData name="Jungu Kang" userId="c6323cfc4e9685da" providerId="LiveId" clId="{CF939628-056A-40A5-BD9E-5B1FD977C697}" dt="2022-01-14T03:48:07.913" v="2044" actId="1076"/>
+          <ac:chgData name="Jungu Kang" userId="c6323cfc4e9685da" providerId="LiveId" clId="{CF939628-056A-40A5-BD9E-5B1FD977C697}" dt="2022-01-18T04:20:40.460" v="3046" actId="1036"/>
           <ac:picMkLst>
             <pc:docMk/>
             <pc:sldMk cId="929015462" sldId="261"/>
@@ -410,7 +409,7 @@
           </ac:picMkLst>
         </pc:picChg>
         <pc:picChg chg="add mod">
-          <ac:chgData name="Jungu Kang" userId="c6323cfc4e9685da" providerId="LiveId" clId="{CF939628-056A-40A5-BD9E-5B1FD977C697}" dt="2022-01-14T03:48:38.832" v="2057" actId="1076"/>
+          <ac:chgData name="Jungu Kang" userId="c6323cfc4e9685da" providerId="LiveId" clId="{CF939628-056A-40A5-BD9E-5B1FD977C697}" dt="2022-01-18T04:20:40.460" v="3046" actId="1036"/>
           <ac:picMkLst>
             <pc:docMk/>
             <pc:sldMk cId="929015462" sldId="261"/>
@@ -418,7 +417,7 @@
           </ac:picMkLst>
         </pc:picChg>
         <pc:picChg chg="add mod">
-          <ac:chgData name="Jungu Kang" userId="c6323cfc4e9685da" providerId="LiveId" clId="{CF939628-056A-40A5-BD9E-5B1FD977C697}" dt="2022-01-14T03:48:51.613" v="2060" actId="1076"/>
+          <ac:chgData name="Jungu Kang" userId="c6323cfc4e9685da" providerId="LiveId" clId="{CF939628-056A-40A5-BD9E-5B1FD977C697}" dt="2022-01-18T04:20:40.460" v="3046" actId="1036"/>
           <ac:picMkLst>
             <pc:docMk/>
             <pc:sldMk cId="929015462" sldId="261"/>
@@ -426,7 +425,7 @@
           </ac:picMkLst>
         </pc:picChg>
         <pc:picChg chg="add mod">
-          <ac:chgData name="Jungu Kang" userId="c6323cfc4e9685da" providerId="LiveId" clId="{CF939628-056A-40A5-BD9E-5B1FD977C697}" dt="2022-01-14T03:49:58.900" v="2067" actId="1076"/>
+          <ac:chgData name="Jungu Kang" userId="c6323cfc4e9685da" providerId="LiveId" clId="{CF939628-056A-40A5-BD9E-5B1FD977C697}" dt="2022-01-18T04:20:40.460" v="3046" actId="1036"/>
           <ac:picMkLst>
             <pc:docMk/>
             <pc:sldMk cId="929015462" sldId="261"/>
@@ -434,7 +433,7 @@
           </ac:picMkLst>
         </pc:picChg>
         <pc:picChg chg="add mod">
-          <ac:chgData name="Jungu Kang" userId="c6323cfc4e9685da" providerId="LiveId" clId="{CF939628-056A-40A5-BD9E-5B1FD977C697}" dt="2022-01-14T03:49:57.158" v="2066" actId="1076"/>
+          <ac:chgData name="Jungu Kang" userId="c6323cfc4e9685da" providerId="LiveId" clId="{CF939628-056A-40A5-BD9E-5B1FD977C697}" dt="2022-01-18T04:20:40.460" v="3046" actId="1036"/>
           <ac:picMkLst>
             <pc:docMk/>
             <pc:sldMk cId="929015462" sldId="261"/>
@@ -442,7 +441,7 @@
           </ac:picMkLst>
         </pc:picChg>
         <pc:picChg chg="add mod">
-          <ac:chgData name="Jungu Kang" userId="c6323cfc4e9685da" providerId="LiveId" clId="{CF939628-056A-40A5-BD9E-5B1FD977C697}" dt="2022-01-14T03:48:24.943" v="2052" actId="1076"/>
+          <ac:chgData name="Jungu Kang" userId="c6323cfc4e9685da" providerId="LiveId" clId="{CF939628-056A-40A5-BD9E-5B1FD977C697}" dt="2022-01-18T04:20:40.460" v="3046" actId="1036"/>
           <ac:picMkLst>
             <pc:docMk/>
             <pc:sldMk cId="929015462" sldId="261"/>
@@ -450,7 +449,7 @@
           </ac:picMkLst>
         </pc:picChg>
         <pc:picChg chg="add mod">
-          <ac:chgData name="Jungu Kang" userId="c6323cfc4e9685da" providerId="LiveId" clId="{CF939628-056A-40A5-BD9E-5B1FD977C697}" dt="2022-01-14T03:48:44.819" v="2058" actId="1076"/>
+          <ac:chgData name="Jungu Kang" userId="c6323cfc4e9685da" providerId="LiveId" clId="{CF939628-056A-40A5-BD9E-5B1FD977C697}" dt="2022-01-18T04:20:40.460" v="3046" actId="1036"/>
           <ac:picMkLst>
             <pc:docMk/>
             <pc:sldMk cId="929015462" sldId="261"/>
@@ -458,7 +457,7 @@
           </ac:picMkLst>
         </pc:picChg>
         <pc:picChg chg="add mod">
-          <ac:chgData name="Jungu Kang" userId="c6323cfc4e9685da" providerId="LiveId" clId="{CF939628-056A-40A5-BD9E-5B1FD977C697}" dt="2022-01-14T03:48:49.325" v="2059" actId="1076"/>
+          <ac:chgData name="Jungu Kang" userId="c6323cfc4e9685da" providerId="LiveId" clId="{CF939628-056A-40A5-BD9E-5B1FD977C697}" dt="2022-01-18T04:20:40.460" v="3046" actId="1036"/>
           <ac:picMkLst>
             <pc:docMk/>
             <pc:sldMk cId="929015462" sldId="261"/>
@@ -466,8 +465,8 @@
           </ac:picMkLst>
         </pc:picChg>
       </pc:sldChg>
-      <pc:sldChg chg="addSp delSp modSp new mod">
-        <pc:chgData name="Jungu Kang" userId="c6323cfc4e9685da" providerId="LiveId" clId="{CF939628-056A-40A5-BD9E-5B1FD977C697}" dt="2022-01-14T03:57:21.081" v="2071" actId="21"/>
+      <pc:sldChg chg="addSp delSp modSp new del mod">
+        <pc:chgData name="Jungu Kang" userId="c6323cfc4e9685da" providerId="LiveId" clId="{CF939628-056A-40A5-BD9E-5B1FD977C697}" dt="2022-01-18T04:34:41.315" v="3285" actId="47"/>
         <pc:sldMkLst>
           <pc:docMk/>
           <pc:sldMk cId="2463496334" sldId="262"/>
@@ -514,7 +513,7 @@
         </pc:picChg>
       </pc:sldChg>
       <pc:sldChg chg="addSp delSp modSp new mod">
-        <pc:chgData name="Jungu Kang" userId="c6323cfc4e9685da" providerId="LiveId" clId="{CF939628-056A-40A5-BD9E-5B1FD977C697}" dt="2022-01-14T02:27:58.777" v="1776" actId="6549"/>
+        <pc:chgData name="Jungu Kang" userId="c6323cfc4e9685da" providerId="LiveId" clId="{CF939628-056A-40A5-BD9E-5B1FD977C697}" dt="2022-01-18T04:39:49.603" v="3435" actId="14100"/>
         <pc:sldMkLst>
           <pc:docMk/>
           <pc:sldMk cId="1953813529" sldId="263"/>
@@ -535,6 +534,14 @@
             <ac:spMk id="3" creationId="{9CF87727-52A4-43E9-BB30-3E8F12C876AD}"/>
           </ac:spMkLst>
         </pc:spChg>
+        <pc:picChg chg="add mod modCrop">
+          <ac:chgData name="Jungu Kang" userId="c6323cfc4e9685da" providerId="LiveId" clId="{CF939628-056A-40A5-BD9E-5B1FD977C697}" dt="2022-01-18T04:39:17.003" v="3430" actId="14100"/>
+          <ac:picMkLst>
+            <pc:docMk/>
+            <pc:sldMk cId="1953813529" sldId="263"/>
+            <ac:picMk id="5" creationId="{57BB6F8F-7631-4830-B158-BF27C96B3C9D}"/>
+          </ac:picMkLst>
+        </pc:picChg>
         <pc:picChg chg="add del mod">
           <ac:chgData name="Jungu Kang" userId="c6323cfc4e9685da" providerId="LiveId" clId="{CF939628-056A-40A5-BD9E-5B1FD977C697}" dt="2022-01-14T02:27:07.345" v="1765" actId="478"/>
           <ac:picMkLst>
@@ -543,8 +550,8 @@
             <ac:picMk id="5" creationId="{99EB2BCD-4E0F-428B-BAAD-9A61C0E0B12B}"/>
           </ac:picMkLst>
         </pc:picChg>
-        <pc:picChg chg="add mod">
-          <ac:chgData name="Jungu Kang" userId="c6323cfc4e9685da" providerId="LiveId" clId="{CF939628-056A-40A5-BD9E-5B1FD977C697}" dt="2022-01-14T02:27:19.645" v="1768" actId="14100"/>
+        <pc:picChg chg="add del mod">
+          <ac:chgData name="Jungu Kang" userId="c6323cfc4e9685da" providerId="LiveId" clId="{CF939628-056A-40A5-BD9E-5B1FD977C697}" dt="2022-01-18T04:38:46.978" v="3424" actId="478"/>
           <ac:picMkLst>
             <pc:docMk/>
             <pc:sldMk cId="1953813529" sldId="263"/>
@@ -559,17 +566,33 @@
             <ac:picMk id="7" creationId="{E96694C4-A8C5-40ED-BA77-32073572095A}"/>
           </ac:picMkLst>
         </pc:picChg>
-        <pc:picChg chg="add mod">
-          <ac:chgData name="Jungu Kang" userId="c6323cfc4e9685da" providerId="LiveId" clId="{CF939628-056A-40A5-BD9E-5B1FD977C697}" dt="2022-01-14T02:27:46.021" v="1773" actId="14100"/>
+        <pc:picChg chg="add del">
+          <ac:chgData name="Jungu Kang" userId="c6323cfc4e9685da" providerId="LiveId" clId="{CF939628-056A-40A5-BD9E-5B1FD977C697}" dt="2022-01-18T04:39:28.571" v="3432" actId="22"/>
+          <ac:picMkLst>
+            <pc:docMk/>
+            <pc:sldMk cId="1953813529" sldId="263"/>
+            <ac:picMk id="8" creationId="{D57CBC52-F234-42E2-BE24-1785AC9EA158}"/>
+          </ac:picMkLst>
+        </pc:picChg>
+        <pc:picChg chg="add del mod">
+          <ac:chgData name="Jungu Kang" userId="c6323cfc4e9685da" providerId="LiveId" clId="{CF939628-056A-40A5-BD9E-5B1FD977C697}" dt="2022-01-18T04:38:47.618" v="3425" actId="478"/>
           <ac:picMkLst>
             <pc:docMk/>
             <pc:sldMk cId="1953813529" sldId="263"/>
             <ac:picMk id="9" creationId="{E3772921-C00C-463E-952E-7BE93130AB78}"/>
           </ac:picMkLst>
         </pc:picChg>
+        <pc:picChg chg="add mod">
+          <ac:chgData name="Jungu Kang" userId="c6323cfc4e9685da" providerId="LiveId" clId="{CF939628-056A-40A5-BD9E-5B1FD977C697}" dt="2022-01-18T04:39:49.603" v="3435" actId="14100"/>
+          <ac:picMkLst>
+            <pc:docMk/>
+            <pc:sldMk cId="1953813529" sldId="263"/>
+            <ac:picMk id="11" creationId="{9D8B6B36-6400-423B-9751-E81C6BA98CC6}"/>
+          </ac:picMkLst>
+        </pc:picChg>
       </pc:sldChg>
       <pc:sldChg chg="addSp delSp modSp new mod">
-        <pc:chgData name="Jungu Kang" userId="c6323cfc4e9685da" providerId="LiveId" clId="{CF939628-056A-40A5-BD9E-5B1FD977C697}" dt="2022-01-14T03:02:01.977" v="1805" actId="1076"/>
+        <pc:chgData name="Jungu Kang" userId="c6323cfc4e9685da" providerId="LiveId" clId="{CF939628-056A-40A5-BD9E-5B1FD977C697}" dt="2022-01-18T04:42:52.550" v="3445" actId="14100"/>
         <pc:sldMkLst>
           <pc:docMk/>
           <pc:sldMk cId="2466182110" sldId="264"/>
@@ -590,6 +613,14 @@
             <ac:spMk id="3" creationId="{44EBAFDF-C98F-432E-A6DE-AA6919523CF4}"/>
           </ac:spMkLst>
         </pc:spChg>
+        <pc:picChg chg="add mod modCrop">
+          <ac:chgData name="Jungu Kang" userId="c6323cfc4e9685da" providerId="LiveId" clId="{CF939628-056A-40A5-BD9E-5B1FD977C697}" dt="2022-01-18T04:42:29.525" v="3442" actId="14100"/>
+          <ac:picMkLst>
+            <pc:docMk/>
+            <pc:sldMk cId="2466182110" sldId="264"/>
+            <ac:picMk id="5" creationId="{1C45B0E6-F864-44A1-A13D-E8402F72C06D}"/>
+          </ac:picMkLst>
+        </pc:picChg>
         <pc:picChg chg="add del mod">
           <ac:chgData name="Jungu Kang" userId="c6323cfc4e9685da" providerId="LiveId" clId="{CF939628-056A-40A5-BD9E-5B1FD977C697}" dt="2022-01-14T03:01:55.111" v="1804" actId="478"/>
           <ac:picMkLst>
@@ -598,17 +629,25 @@
             <ac:picMk id="5" creationId="{636110D4-41DF-4F64-9150-F5DE952FCCD4}"/>
           </ac:picMkLst>
         </pc:picChg>
-        <pc:picChg chg="add mod">
-          <ac:chgData name="Jungu Kang" userId="c6323cfc4e9685da" providerId="LiveId" clId="{CF939628-056A-40A5-BD9E-5B1FD977C697}" dt="2022-01-14T03:02:01.977" v="1805" actId="1076"/>
+        <pc:picChg chg="add del mod">
+          <ac:chgData name="Jungu Kang" userId="c6323cfc4e9685da" providerId="LiveId" clId="{CF939628-056A-40A5-BD9E-5B1FD977C697}" dt="2022-01-18T04:41:42.785" v="3436" actId="478"/>
           <ac:picMkLst>
             <pc:docMk/>
             <pc:sldMk cId="2466182110" sldId="264"/>
             <ac:picMk id="6" creationId="{890330D1-F5D0-4288-AF40-ECA02CE1F927}"/>
           </ac:picMkLst>
         </pc:picChg>
+        <pc:picChg chg="add mod">
+          <ac:chgData name="Jungu Kang" userId="c6323cfc4e9685da" providerId="LiveId" clId="{CF939628-056A-40A5-BD9E-5B1FD977C697}" dt="2022-01-18T04:42:52.550" v="3445" actId="14100"/>
+          <ac:picMkLst>
+            <pc:docMk/>
+            <pc:sldMk cId="2466182110" sldId="264"/>
+            <ac:picMk id="8" creationId="{E08780AE-934E-4B2B-BE55-0811152E63C9}"/>
+          </ac:picMkLst>
+        </pc:picChg>
       </pc:sldChg>
       <pc:sldChg chg="addSp delSp modSp new mod">
-        <pc:chgData name="Jungu Kang" userId="c6323cfc4e9685da" providerId="LiveId" clId="{CF939628-056A-40A5-BD9E-5B1FD977C697}" dt="2022-01-14T03:03:43.224" v="1865" actId="20577"/>
+        <pc:chgData name="Jungu Kang" userId="c6323cfc4e9685da" providerId="LiveId" clId="{CF939628-056A-40A5-BD9E-5B1FD977C697}" dt="2022-01-18T04:47:12.977" v="3747" actId="1076"/>
         <pc:sldMkLst>
           <pc:docMk/>
           <pc:sldMk cId="197704666" sldId="265"/>
@@ -622,7 +661,7 @@
           </ac:spMkLst>
         </pc:spChg>
         <pc:spChg chg="add del mod">
-          <ac:chgData name="Jungu Kang" userId="c6323cfc4e9685da" providerId="LiveId" clId="{CF939628-056A-40A5-BD9E-5B1FD977C697}" dt="2022-01-14T03:03:43.224" v="1865" actId="20577"/>
+          <ac:chgData name="Jungu Kang" userId="c6323cfc4e9685da" providerId="LiveId" clId="{CF939628-056A-40A5-BD9E-5B1FD977C697}" dt="2022-01-18T04:46:48.022" v="3740" actId="6549"/>
           <ac:spMkLst>
             <pc:docMk/>
             <pc:sldMk cId="197704666" sldId="265"/>
@@ -638,7 +677,15 @@
           </ac:picMkLst>
         </pc:picChg>
         <pc:picChg chg="add mod">
-          <ac:chgData name="Jungu Kang" userId="c6323cfc4e9685da" providerId="LiveId" clId="{CF939628-056A-40A5-BD9E-5B1FD977C697}" dt="2022-01-14T03:02:57.392" v="1822" actId="1076"/>
+          <ac:chgData name="Jungu Kang" userId="c6323cfc4e9685da" providerId="LiveId" clId="{CF939628-056A-40A5-BD9E-5B1FD977C697}" dt="2022-01-18T04:47:12.977" v="3747" actId="1076"/>
+          <ac:picMkLst>
+            <pc:docMk/>
+            <pc:sldMk cId="197704666" sldId="265"/>
+            <ac:picMk id="5" creationId="{C83D7F07-8BF9-434C-A592-0300A7D0506C}"/>
+          </ac:picMkLst>
+        </pc:picChg>
+        <pc:picChg chg="add del mod">
+          <ac:chgData name="Jungu Kang" userId="c6323cfc4e9685da" providerId="LiveId" clId="{CF939628-056A-40A5-BD9E-5B1FD977C697}" dt="2022-01-18T04:44:02.199" v="3446" actId="478"/>
           <ac:picMkLst>
             <pc:docMk/>
             <pc:sldMk cId="197704666" sldId="265"/>
@@ -654,7 +701,15 @@
           </ac:picMkLst>
         </pc:picChg>
         <pc:picChg chg="add mod">
-          <ac:chgData name="Jungu Kang" userId="c6323cfc4e9685da" providerId="LiveId" clId="{CF939628-056A-40A5-BD9E-5B1FD977C697}" dt="2022-01-14T03:02:57.392" v="1822" actId="1076"/>
+          <ac:chgData name="Jungu Kang" userId="c6323cfc4e9685da" providerId="LiveId" clId="{CF939628-056A-40A5-BD9E-5B1FD977C697}" dt="2022-01-18T04:47:09.242" v="3746" actId="1076"/>
+          <ac:picMkLst>
+            <pc:docMk/>
+            <pc:sldMk cId="197704666" sldId="265"/>
+            <ac:picMk id="8" creationId="{0188EDB0-FC2A-44AB-9558-8FF2EF90FFA7}"/>
+          </ac:picMkLst>
+        </pc:picChg>
+        <pc:picChg chg="add del mod">
+          <ac:chgData name="Jungu Kang" userId="c6323cfc4e9685da" providerId="LiveId" clId="{CF939628-056A-40A5-BD9E-5B1FD977C697}" dt="2022-01-18T04:44:02.719" v="3447" actId="478"/>
           <ac:picMkLst>
             <pc:docMk/>
             <pc:sldMk cId="197704666" sldId="265"/>
@@ -662,14 +717,14 @@
           </ac:picMkLst>
         </pc:picChg>
       </pc:sldChg>
-      <pc:sldChg chg="addSp delSp modSp new mod">
-        <pc:chgData name="Jungu Kang" userId="c6323cfc4e9685da" providerId="LiveId" clId="{CF939628-056A-40A5-BD9E-5B1FD977C697}" dt="2022-01-14T03:04:23.011" v="1868" actId="1076"/>
+      <pc:sldChg chg="addSp delSp modSp new del mod">
+        <pc:chgData name="Jungu Kang" userId="c6323cfc4e9685da" providerId="LiveId" clId="{CF939628-056A-40A5-BD9E-5B1FD977C697}" dt="2022-01-18T05:01:18.651" v="3758" actId="47"/>
         <pc:sldMkLst>
           <pc:docMk/>
           <pc:sldMk cId="565836537" sldId="266"/>
         </pc:sldMkLst>
         <pc:spChg chg="mod">
-          <ac:chgData name="Jungu Kang" userId="c6323cfc4e9685da" providerId="LiveId" clId="{CF939628-056A-40A5-BD9E-5B1FD977C697}" dt="2022-01-13T21:02:03.425" v="1290"/>
+          <ac:chgData name="Jungu Kang" userId="c6323cfc4e9685da" providerId="LiveId" clId="{CF939628-056A-40A5-BD9E-5B1FD977C697}" dt="2022-01-18T04:47:38.117" v="3755" actId="20577"/>
           <ac:spMkLst>
             <pc:docMk/>
             <pc:sldMk cId="565836537" sldId="266"/>
@@ -677,7 +732,7 @@
           </ac:spMkLst>
         </pc:spChg>
         <pc:spChg chg="mod">
-          <ac:chgData name="Jungu Kang" userId="c6323cfc4e9685da" providerId="LiveId" clId="{CF939628-056A-40A5-BD9E-5B1FD977C697}" dt="2022-01-13T21:02:03.425" v="1290"/>
+          <ac:chgData name="Jungu Kang" userId="c6323cfc4e9685da" providerId="LiveId" clId="{CF939628-056A-40A5-BD9E-5B1FD977C697}" dt="2022-01-18T04:47:59.453" v="3757" actId="6549"/>
           <ac:spMkLst>
             <pc:docMk/>
             <pc:sldMk cId="565836537" sldId="266"/>
@@ -708,8 +763,8 @@
             <ac:picMk id="5" creationId="{7D9871A7-2A15-434A-A812-0F6C3FE60D3C}"/>
           </ac:picMkLst>
         </pc:picChg>
-        <pc:picChg chg="add mod">
-          <ac:chgData name="Jungu Kang" userId="c6323cfc4e9685da" providerId="LiveId" clId="{CF939628-056A-40A5-BD9E-5B1FD977C697}" dt="2022-01-14T03:04:23.011" v="1868" actId="1076"/>
+        <pc:picChg chg="add del mod">
+          <ac:chgData name="Jungu Kang" userId="c6323cfc4e9685da" providerId="LiveId" clId="{CF939628-056A-40A5-BD9E-5B1FD977C697}" dt="2022-01-18T04:47:54.229" v="3756" actId="478"/>
           <ac:picMkLst>
             <pc:docMk/>
             <pc:sldMk cId="565836537" sldId="266"/>
@@ -734,13 +789,13 @@
         </pc:picChg>
       </pc:sldChg>
       <pc:sldChg chg="addSp delSp modSp new mod">
-        <pc:chgData name="Jungu Kang" userId="c6323cfc4e9685da" providerId="LiveId" clId="{CF939628-056A-40A5-BD9E-5B1FD977C697}" dt="2022-01-14T04:43:17.790" v="2780" actId="1076"/>
+        <pc:chgData name="Jungu Kang" userId="c6323cfc4e9685da" providerId="LiveId" clId="{CF939628-056A-40A5-BD9E-5B1FD977C697}" dt="2022-01-18T05:02:28.137" v="3800" actId="20577"/>
         <pc:sldMkLst>
           <pc:docMk/>
           <pc:sldMk cId="4104117720" sldId="267"/>
         </pc:sldMkLst>
         <pc:spChg chg="mod">
-          <ac:chgData name="Jungu Kang" userId="c6323cfc4e9685da" providerId="LiveId" clId="{CF939628-056A-40A5-BD9E-5B1FD977C697}" dt="2022-01-13T21:02:03.425" v="1290"/>
+          <ac:chgData name="Jungu Kang" userId="c6323cfc4e9685da" providerId="LiveId" clId="{CF939628-056A-40A5-BD9E-5B1FD977C697}" dt="2022-01-18T05:01:22.928" v="3766" actId="20577"/>
           <ac:spMkLst>
             <pc:docMk/>
             <pc:sldMk cId="4104117720" sldId="267"/>
@@ -780,7 +835,7 @@
           </ac:spMkLst>
         </pc:spChg>
         <pc:spChg chg="add mod">
-          <ac:chgData name="Jungu Kang" userId="c6323cfc4e9685da" providerId="LiveId" clId="{CF939628-056A-40A5-BD9E-5B1FD977C697}" dt="2022-01-14T03:05:23.415" v="1884" actId="20577"/>
+          <ac:chgData name="Jungu Kang" userId="c6323cfc4e9685da" providerId="LiveId" clId="{CF939628-056A-40A5-BD9E-5B1FD977C697}" dt="2022-01-18T05:02:28.137" v="3800" actId="20577"/>
           <ac:spMkLst>
             <pc:docMk/>
             <pc:sldMk cId="4104117720" sldId="267"/>
@@ -845,7 +900,7 @@
         </pc:picChg>
       </pc:sldChg>
       <pc:sldChg chg="modSp new mod">
-        <pc:chgData name="Jungu Kang" userId="c6323cfc4e9685da" providerId="LiveId" clId="{CF939628-056A-40A5-BD9E-5B1FD977C697}" dt="2022-01-14T04:42:43.613" v="2779" actId="20577"/>
+        <pc:chgData name="Jungu Kang" userId="c6323cfc4e9685da" providerId="LiveId" clId="{CF939628-056A-40A5-BD9E-5B1FD977C697}" dt="2022-01-18T05:03:41.600" v="3847" actId="20577"/>
         <pc:sldMkLst>
           <pc:docMk/>
           <pc:sldMk cId="3063354972" sldId="268"/>
@@ -859,7 +914,7 @@
           </ac:spMkLst>
         </pc:spChg>
         <pc:spChg chg="mod">
-          <ac:chgData name="Jungu Kang" userId="c6323cfc4e9685da" providerId="LiveId" clId="{CF939628-056A-40A5-BD9E-5B1FD977C697}" dt="2022-01-14T04:42:43.613" v="2779" actId="20577"/>
+          <ac:chgData name="Jungu Kang" userId="c6323cfc4e9685da" providerId="LiveId" clId="{CF939628-056A-40A5-BD9E-5B1FD977C697}" dt="2022-01-18T05:03:41.600" v="3847" actId="20577"/>
           <ac:spMkLst>
             <pc:docMk/>
             <pc:sldMk cId="3063354972" sldId="268"/>
@@ -891,7 +946,7 @@
         </pc:spChg>
       </pc:sldChg>
       <pc:sldChg chg="addSp delSp modSp new mod">
-        <pc:chgData name="Jungu Kang" userId="c6323cfc4e9685da" providerId="LiveId" clId="{CF939628-056A-40A5-BD9E-5B1FD977C697}" dt="2022-01-14T02:28:16.192" v="1802" actId="20577"/>
+        <pc:chgData name="Jungu Kang" userId="c6323cfc4e9685da" providerId="LiveId" clId="{CF939628-056A-40A5-BD9E-5B1FD977C697}" dt="2022-01-18T04:38:05.891" v="3422" actId="6549"/>
         <pc:sldMkLst>
           <pc:docMk/>
           <pc:sldMk cId="2358876094" sldId="270"/>
@@ -905,13 +960,21 @@
           </ac:spMkLst>
         </pc:spChg>
         <pc:spChg chg="mod">
-          <ac:chgData name="Jungu Kang" userId="c6323cfc4e9685da" providerId="LiveId" clId="{CF939628-056A-40A5-BD9E-5B1FD977C697}" dt="2022-01-14T02:28:16.192" v="1802" actId="20577"/>
+          <ac:chgData name="Jungu Kang" userId="c6323cfc4e9685da" providerId="LiveId" clId="{CF939628-056A-40A5-BD9E-5B1FD977C697}" dt="2022-01-18T04:38:05.891" v="3422" actId="6549"/>
           <ac:spMkLst>
             <pc:docMk/>
             <pc:sldMk cId="2358876094" sldId="270"/>
             <ac:spMk id="3" creationId="{53994712-BA6B-42A9-948F-3A36A892A867}"/>
           </ac:spMkLst>
         </pc:spChg>
+        <pc:picChg chg="add mod modCrop">
+          <ac:chgData name="Jungu Kang" userId="c6323cfc4e9685da" providerId="LiveId" clId="{CF939628-056A-40A5-BD9E-5B1FD977C697}" dt="2022-01-18T04:35:56.643" v="3292" actId="14100"/>
+          <ac:picMkLst>
+            <pc:docMk/>
+            <pc:sldMk cId="2358876094" sldId="270"/>
+            <ac:picMk id="5" creationId="{BC8CA503-BF9E-4585-B8E6-F629E587132C}"/>
+          </ac:picMkLst>
+        </pc:picChg>
         <pc:picChg chg="add del mod">
           <ac:chgData name="Jungu Kang" userId="c6323cfc4e9685da" providerId="LiveId" clId="{CF939628-056A-40A5-BD9E-5B1FD977C697}" dt="2022-01-14T02:25:11.217" v="1754" actId="478"/>
           <ac:picMkLst>
@@ -929,15 +992,23 @@
           </ac:picMkLst>
         </pc:picChg>
         <pc:picChg chg="add mod">
-          <ac:chgData name="Jungu Kang" userId="c6323cfc4e9685da" providerId="LiveId" clId="{CF939628-056A-40A5-BD9E-5B1FD977C697}" dt="2022-01-14T02:26:19.374" v="1764" actId="14100"/>
+          <ac:chgData name="Jungu Kang" userId="c6323cfc4e9685da" providerId="LiveId" clId="{CF939628-056A-40A5-BD9E-5B1FD977C697}" dt="2022-01-18T04:36:24.747" v="3296" actId="14100"/>
+          <ac:picMkLst>
+            <pc:docMk/>
+            <pc:sldMk cId="2358876094" sldId="270"/>
+            <ac:picMk id="7" creationId="{7C6D079B-CBFC-437D-82F8-2BC58C5AC102}"/>
+          </ac:picMkLst>
+        </pc:picChg>
+        <pc:picChg chg="add del mod">
+          <ac:chgData name="Jungu Kang" userId="c6323cfc4e9685da" providerId="LiveId" clId="{CF939628-056A-40A5-BD9E-5B1FD977C697}" dt="2022-01-18T04:35:58.011" v="3293" actId="478"/>
           <ac:picMkLst>
             <pc:docMk/>
             <pc:sldMk cId="2358876094" sldId="270"/>
             <ac:picMk id="9" creationId="{8BB10034-C14C-40B0-9FAE-A7155923AF18}"/>
           </ac:picMkLst>
         </pc:picChg>
-        <pc:picChg chg="add mod">
-          <ac:chgData name="Jungu Kang" userId="c6323cfc4e9685da" providerId="LiveId" clId="{CF939628-056A-40A5-BD9E-5B1FD977C697}" dt="2022-01-14T02:26:05.806" v="1760" actId="14100"/>
+        <pc:picChg chg="add del mod">
+          <ac:chgData name="Jungu Kang" userId="c6323cfc4e9685da" providerId="LiveId" clId="{CF939628-056A-40A5-BD9E-5B1FD977C697}" dt="2022-01-18T04:35:31.364" v="3286" actId="478"/>
           <ac:picMkLst>
             <pc:docMk/>
             <pc:sldMk cId="2358876094" sldId="270"/>
@@ -1030,6 +1101,60 @@
             <ac:spMk id="3" creationId="{7D7E2DBB-3164-4F4E-BABA-0A28783E8496}"/>
           </ac:spMkLst>
         </pc:spChg>
+      </pc:sldChg>
+      <pc:sldChg chg="addSp delSp modSp add mod">
+        <pc:chgData name="Jungu Kang" userId="c6323cfc4e9685da" providerId="LiveId" clId="{CF939628-056A-40A5-BD9E-5B1FD977C697}" dt="2022-01-18T04:34:34.245" v="3284" actId="20577"/>
+        <pc:sldMkLst>
+          <pc:docMk/>
+          <pc:sldMk cId="1524411021" sldId="273"/>
+        </pc:sldMkLst>
+        <pc:spChg chg="mod">
+          <ac:chgData name="Jungu Kang" userId="c6323cfc4e9685da" providerId="LiveId" clId="{CF939628-056A-40A5-BD9E-5B1FD977C697}" dt="2022-01-18T04:31:23.246" v="3161" actId="20577"/>
+          <ac:spMkLst>
+            <pc:docMk/>
+            <pc:sldMk cId="1524411021" sldId="273"/>
+            <ac:spMk id="2" creationId="{CC4D835D-01FE-4F47-93BC-992AA35659C0}"/>
+          </ac:spMkLst>
+        </pc:spChg>
+        <pc:spChg chg="mod">
+          <ac:chgData name="Jungu Kang" userId="c6323cfc4e9685da" providerId="LiveId" clId="{CF939628-056A-40A5-BD9E-5B1FD977C697}" dt="2022-01-18T04:34:34.245" v="3284" actId="20577"/>
+          <ac:spMkLst>
+            <pc:docMk/>
+            <pc:sldMk cId="1524411021" sldId="273"/>
+            <ac:spMk id="3" creationId="{42B5C384-3324-4FD7-9315-26118C35AC4B}"/>
+          </ac:spMkLst>
+        </pc:spChg>
+        <pc:picChg chg="add mod modCrop">
+          <ac:chgData name="Jungu Kang" userId="c6323cfc4e9685da" providerId="LiveId" clId="{CF939628-056A-40A5-BD9E-5B1FD977C697}" dt="2022-01-18T04:33:20.935" v="3238" actId="14100"/>
+          <ac:picMkLst>
+            <pc:docMk/>
+            <pc:sldMk cId="1524411021" sldId="273"/>
+            <ac:picMk id="5" creationId="{C3F9E58F-61BB-4108-8AC8-942CCC710835}"/>
+          </ac:picMkLst>
+        </pc:picChg>
+        <pc:picChg chg="del">
+          <ac:chgData name="Jungu Kang" userId="c6323cfc4e9685da" providerId="LiveId" clId="{CF939628-056A-40A5-BD9E-5B1FD977C697}" dt="2022-01-18T04:32:14.392" v="3228" actId="478"/>
+          <ac:picMkLst>
+            <pc:docMk/>
+            <pc:sldMk cId="1524411021" sldId="273"/>
+            <ac:picMk id="6" creationId="{8E5E0AA9-08BE-426F-A40A-91736291A528}"/>
+          </ac:picMkLst>
+        </pc:picChg>
+        <pc:picChg chg="add mod">
+          <ac:chgData name="Jungu Kang" userId="c6323cfc4e9685da" providerId="LiveId" clId="{CF939628-056A-40A5-BD9E-5B1FD977C697}" dt="2022-01-18T04:34:03.977" v="3243" actId="14100"/>
+          <ac:picMkLst>
+            <pc:docMk/>
+            <pc:sldMk cId="1524411021" sldId="273"/>
+            <ac:picMk id="8" creationId="{BD6D5182-0D14-444C-9CD6-525EE51D46B1}"/>
+          </ac:picMkLst>
+        </pc:picChg>
+      </pc:sldChg>
+      <pc:sldChg chg="new del">
+        <pc:chgData name="Jungu Kang" userId="c6323cfc4e9685da" providerId="LiveId" clId="{CF939628-056A-40A5-BD9E-5B1FD977C697}" dt="2022-01-18T05:02:06.875" v="3770" actId="47"/>
+        <pc:sldMkLst>
+          <pc:docMk/>
+          <pc:sldMk cId="1070983337" sldId="274"/>
+        </pc:sldMkLst>
       </pc:sldChg>
     </pc:docChg>
   </pc:docChgLst>
@@ -1212,7 +1337,7 @@
           <a:p>
             <a:fld id="{F56FB687-0532-4A7F-B30F-17D2847BE244}" type="datetimeFigureOut">
               <a:rPr lang="en-US" smtClean="0"/>
-              <a:t>1/13/2022</a:t>
+              <a:t>1/17/2022</a:t>
             </a:fld>
             <a:endParaRPr lang="en-US"/>
           </a:p>
@@ -1382,7 +1507,7 @@
           <a:p>
             <a:fld id="{F56FB687-0532-4A7F-B30F-17D2847BE244}" type="datetimeFigureOut">
               <a:rPr lang="en-US" smtClean="0"/>
-              <a:t>1/13/2022</a:t>
+              <a:t>1/17/2022</a:t>
             </a:fld>
             <a:endParaRPr lang="en-US"/>
           </a:p>
@@ -1605,7 +1730,7 @@
           <a:p>
             <a:fld id="{F56FB687-0532-4A7F-B30F-17D2847BE244}" type="datetimeFigureOut">
               <a:rPr lang="en-US" smtClean="0"/>
-              <a:t>1/13/2022</a:t>
+              <a:t>1/17/2022</a:t>
             </a:fld>
             <a:endParaRPr lang="en-US"/>
           </a:p>
@@ -1785,7 +1910,7 @@
           <a:p>
             <a:fld id="{F56FB687-0532-4A7F-B30F-17D2847BE244}" type="datetimeFigureOut">
               <a:rPr lang="en-US" smtClean="0"/>
-              <a:t>1/13/2022</a:t>
+              <a:t>1/17/2022</a:t>
             </a:fld>
             <a:endParaRPr lang="en-US"/>
           </a:p>
@@ -2091,7 +2216,7 @@
           <a:p>
             <a:fld id="{F56FB687-0532-4A7F-B30F-17D2847BE244}" type="datetimeFigureOut">
               <a:rPr lang="en-US" smtClean="0"/>
-              <a:t>1/13/2022</a:t>
+              <a:t>1/17/2022</a:t>
             </a:fld>
             <a:endParaRPr lang="en-US"/>
           </a:p>
@@ -2395,7 +2520,7 @@
           <a:p>
             <a:fld id="{F56FB687-0532-4A7F-B30F-17D2847BE244}" type="datetimeFigureOut">
               <a:rPr lang="en-US" smtClean="0"/>
-              <a:t>1/13/2022</a:t>
+              <a:t>1/17/2022</a:t>
             </a:fld>
             <a:endParaRPr lang="en-US"/>
           </a:p>
@@ -2817,7 +2942,7 @@
           <a:p>
             <a:fld id="{F56FB687-0532-4A7F-B30F-17D2847BE244}" type="datetimeFigureOut">
               <a:rPr lang="en-US" smtClean="0"/>
-              <a:t>1/13/2022</a:t>
+              <a:t>1/17/2022</a:t>
             </a:fld>
             <a:endParaRPr lang="en-US"/>
           </a:p>
@@ -2935,7 +3060,7 @@
           <a:p>
             <a:fld id="{F56FB687-0532-4A7F-B30F-17D2847BE244}" type="datetimeFigureOut">
               <a:rPr lang="en-US" smtClean="0"/>
-              <a:t>1/13/2022</a:t>
+              <a:t>1/17/2022</a:t>
             </a:fld>
             <a:endParaRPr lang="en-US"/>
           </a:p>
@@ -3030,7 +3155,7 @@
           <a:p>
             <a:fld id="{F56FB687-0532-4A7F-B30F-17D2847BE244}" type="datetimeFigureOut">
               <a:rPr lang="en-US" smtClean="0"/>
-              <a:t>1/13/2022</a:t>
+              <a:t>1/17/2022</a:t>
             </a:fld>
             <a:endParaRPr lang="en-US"/>
           </a:p>
@@ -3303,7 +3428,7 @@
           <a:p>
             <a:fld id="{F56FB687-0532-4A7F-B30F-17D2847BE244}" type="datetimeFigureOut">
               <a:rPr lang="en-US" smtClean="0"/>
-              <a:t>1/13/2022</a:t>
+              <a:t>1/17/2022</a:t>
             </a:fld>
             <a:endParaRPr lang="en-US"/>
           </a:p>
@@ -3568,7 +3693,7 @@
           <a:p>
             <a:fld id="{F56FB687-0532-4A7F-B30F-17D2847BE244}" type="datetimeFigureOut">
               <a:rPr lang="en-US" smtClean="0"/>
-              <a:t>1/13/2022</a:t>
+              <a:t>1/17/2022</a:t>
             </a:fld>
             <a:endParaRPr lang="en-US"/>
           </a:p>
@@ -3817,7 +3942,7 @@
           <a:p>
             <a:fld id="{F56FB687-0532-4A7F-B30F-17D2847BE244}" type="datetimeFigureOut">
               <a:rPr lang="en-US" smtClean="0"/>
-              <a:t>1/13/2022</a:t>
+              <a:t>1/17/2022</a:t>
             </a:fld>
             <a:endParaRPr lang="en-US"/>
           </a:p>
@@ -4423,10 +4548,10 @@
       </p:sp>
       <p:pic>
         <p:nvPicPr>
-          <p:cNvPr id="6" name="Picture 5">
+          <p:cNvPr id="5" name="Picture 4">
             <a:extLst>
               <a:ext uri="{FF2B5EF4-FFF2-40B4-BE49-F238E27FC236}">
-                <a16:creationId xmlns:a16="http://schemas.microsoft.com/office/drawing/2014/main" id="{61E617F0-871A-4354-AC07-39E00E45455A}"/>
+                <a16:creationId xmlns:a16="http://schemas.microsoft.com/office/drawing/2014/main" id="{57BB6F8F-7631-4830-B158-BF27C96B3C9D}"/>
               </a:ext>
             </a:extLst>
           </p:cNvPr>
@@ -4435,16 +4560,15 @@
           </p:cNvPicPr>
           <p:nvPr/>
         </p:nvPicPr>
-        <p:blipFill>
+        <p:blipFill rotWithShape="1">
           <a:blip r:embed="rId2"/>
-          <a:stretch>
-            <a:fillRect/>
-          </a:stretch>
+          <a:srcRect r="50000" b="50000"/>
+          <a:stretch/>
         </p:blipFill>
         <p:spPr>
           <a:xfrm>
-            <a:off x="1202919" y="3435169"/>
-            <a:ext cx="4228063" cy="2670356"/>
+            <a:off x="1202919" y="3429000"/>
+            <a:ext cx="4126639" cy="2788920"/>
           </a:xfrm>
           <a:prstGeom prst="rect">
             <a:avLst/>
@@ -4453,10 +4577,10 @@
       </p:pic>
       <p:pic>
         <p:nvPicPr>
-          <p:cNvPr id="9" name="Picture 8">
+          <p:cNvPr id="11" name="Picture 10">
             <a:extLst>
               <a:ext uri="{FF2B5EF4-FFF2-40B4-BE49-F238E27FC236}">
-                <a16:creationId xmlns:a16="http://schemas.microsoft.com/office/drawing/2014/main" id="{E3772921-C00C-463E-952E-7BE93130AB78}"/>
+                <a16:creationId xmlns:a16="http://schemas.microsoft.com/office/drawing/2014/main" id="{9D8B6B36-6400-423B-9751-E81C6BA98CC6}"/>
               </a:ext>
             </a:extLst>
           </p:cNvPr>
@@ -4473,8 +4597,8 @@
         </p:blipFill>
         <p:spPr>
           <a:xfrm>
-            <a:off x="6095999" y="3428999"/>
-            <a:ext cx="4180039" cy="2675859"/>
+            <a:off x="6094959" y="3429001"/>
+            <a:ext cx="3138263" cy="2788920"/>
           </a:xfrm>
           <a:prstGeom prst="rect">
             <a:avLst/>
@@ -4569,10 +4693,39 @@
       </p:sp>
       <p:pic>
         <p:nvPicPr>
-          <p:cNvPr id="6" name="Picture 5">
+          <p:cNvPr id="5" name="Picture 4">
             <a:extLst>
               <a:ext uri="{FF2B5EF4-FFF2-40B4-BE49-F238E27FC236}">
-                <a16:creationId xmlns:a16="http://schemas.microsoft.com/office/drawing/2014/main" id="{890330D1-F5D0-4288-AF40-ECA02CE1F927}"/>
+                <a16:creationId xmlns:a16="http://schemas.microsoft.com/office/drawing/2014/main" id="{1C45B0E6-F864-44A1-A13D-E8402F72C06D}"/>
+              </a:ext>
+            </a:extLst>
+          </p:cNvPr>
+          <p:cNvPicPr>
+            <a:picLocks noChangeAspect="1"/>
+          </p:cNvPicPr>
+          <p:nvPr/>
+        </p:nvPicPr>
+        <p:blipFill rotWithShape="1">
+          <a:blip r:embed="rId2"/>
+          <a:srcRect r="50000" b="50000"/>
+          <a:stretch/>
+        </p:blipFill>
+        <p:spPr>
+          <a:xfrm>
+            <a:off x="1202918" y="3429000"/>
+            <a:ext cx="4126639" cy="2788920"/>
+          </a:xfrm>
+          <a:prstGeom prst="rect">
+            <a:avLst/>
+          </a:prstGeom>
+        </p:spPr>
+      </p:pic>
+      <p:pic>
+        <p:nvPicPr>
+          <p:cNvPr id="8" name="Picture 7">
+            <a:extLst>
+              <a:ext uri="{FF2B5EF4-FFF2-40B4-BE49-F238E27FC236}">
+                <a16:creationId xmlns:a16="http://schemas.microsoft.com/office/drawing/2014/main" id="{E08780AE-934E-4B2B-BE55-0811152E63C9}"/>
               </a:ext>
             </a:extLst>
           </p:cNvPr>
@@ -4582,15 +4735,15 @@
           <p:nvPr/>
         </p:nvPicPr>
         <p:blipFill>
-          <a:blip r:embed="rId2"/>
+          <a:blip r:embed="rId3"/>
           <a:stretch>
             <a:fillRect/>
           </a:stretch>
         </p:blipFill>
         <p:spPr>
           <a:xfrm>
-            <a:off x="1202919" y="3074670"/>
-            <a:ext cx="5553075" cy="3143250"/>
+            <a:off x="6094959" y="3429001"/>
+            <a:ext cx="3839389" cy="2788920"/>
           </a:xfrm>
           <a:prstGeom prst="rect">
             <a:avLst/>
@@ -4678,23 +4831,64 @@
           <a:p>
             <a:r>
               <a:rPr lang="en-US" dirty="0"/>
-              <a:t>Model 1a: all variables(fuel column reselected)</a:t>
-            </a:r>
-          </a:p>
-          <a:p>
+              <a:t>Model</a:t>
+            </a:r>
+          </a:p>
+          <a:p>
+            <a:pPr lvl="1"/>
+            <a:r>
+              <a:rPr lang="en-US" dirty="0" err="1"/>
+              <a:t>train_lm</a:t>
+            </a:r>
             <a:r>
               <a:rPr lang="en-US" dirty="0"/>
-              <a:t>Model 2: no engine cc</a:t>
-            </a:r>
-          </a:p>
-          <a:p>
+              <a:t>: all variables</a:t>
+            </a:r>
+          </a:p>
+          <a:p>
+            <a:pPr lvl="1"/>
             <a:r>
               <a:rPr lang="en-US" dirty="0"/>
-              <a:t>Model 3: take out features having p-value &gt;0.05 </a:t>
-            </a:r>
-          </a:p>
-          <a:p>
-            <a:endParaRPr lang="en-US" dirty="0"/>
+              <a:t>train_lm2: all variables with adjusted </a:t>
+            </a:r>
+            <a:r>
+              <a:rPr lang="en-US" dirty="0" err="1"/>
+              <a:t>dummify</a:t>
+            </a:r>
+            <a:r>
+              <a:rPr lang="en-US" dirty="0"/>
+              <a:t> selection for fuel variable</a:t>
+            </a:r>
+          </a:p>
+          <a:p>
+            <a:pPr lvl="1"/>
+            <a:r>
+              <a:rPr lang="en-US" dirty="0"/>
+              <a:t>train_lm3: removed </a:t>
+            </a:r>
+            <a:r>
+              <a:rPr lang="en-US" dirty="0" err="1"/>
+              <a:t>eng_cc</a:t>
+            </a:r>
+            <a:r>
+              <a:rPr lang="en-US" dirty="0"/>
+              <a:t> that has VIF score higher than 5</a:t>
+            </a:r>
+          </a:p>
+          <a:p>
+            <a:pPr lvl="1"/>
+            <a:r>
+              <a:rPr lang="en-US" dirty="0"/>
+              <a:t>train_lm4: removed </a:t>
+            </a:r>
+            <a:r>
+              <a:rPr lang="en-US" dirty="0" err="1"/>
+              <a:t>mil_km</a:t>
+            </a:r>
+            <a:r>
+              <a:rPr lang="en-US" dirty="0"/>
+              <a:t> that has p-value higher than 0.05</a:t>
+            </a:r>
           </a:p>
           <a:p>
             <a:endParaRPr lang="en-US" dirty="0"/>
@@ -4706,10 +4900,10 @@
       </p:sp>
       <p:pic>
         <p:nvPicPr>
-          <p:cNvPr id="6" name="Picture 5">
+          <p:cNvPr id="5" name="Picture 4">
             <a:extLst>
               <a:ext uri="{FF2B5EF4-FFF2-40B4-BE49-F238E27FC236}">
-                <a16:creationId xmlns:a16="http://schemas.microsoft.com/office/drawing/2014/main" id="{03689C00-C02E-4060-9F0B-A1D996C8F7AC}"/>
+                <a16:creationId xmlns:a16="http://schemas.microsoft.com/office/drawing/2014/main" id="{C83D7F07-8BF9-434C-A592-0300A7D0506C}"/>
               </a:ext>
             </a:extLst>
           </p:cNvPr>
@@ -4726,8 +4920,8 @@
         </p:blipFill>
         <p:spPr>
           <a:xfrm>
-            <a:off x="1202919" y="3588327"/>
-            <a:ext cx="5543550" cy="1352550"/>
+            <a:off x="360909" y="4503706"/>
+            <a:ext cx="5734050" cy="1333500"/>
           </a:xfrm>
           <a:prstGeom prst="rect">
             <a:avLst/>
@@ -4736,10 +4930,10 @@
       </p:pic>
       <p:pic>
         <p:nvPicPr>
-          <p:cNvPr id="9" name="Picture 8">
+          <p:cNvPr id="8" name="Picture 7">
             <a:extLst>
               <a:ext uri="{FF2B5EF4-FFF2-40B4-BE49-F238E27FC236}">
-                <a16:creationId xmlns:a16="http://schemas.microsoft.com/office/drawing/2014/main" id="{D1323EAC-AC97-430B-9F3F-7850B210E2F9}"/>
+                <a16:creationId xmlns:a16="http://schemas.microsoft.com/office/drawing/2014/main" id="{0188EDB0-FC2A-44AB-9558-8FF2EF90FFA7}"/>
               </a:ext>
             </a:extLst>
           </p:cNvPr>
@@ -4756,8 +4950,8 @@
         </p:blipFill>
         <p:spPr>
           <a:xfrm>
-            <a:off x="1202919" y="4940877"/>
-            <a:ext cx="5543550" cy="1352550"/>
+            <a:off x="6094959" y="4503706"/>
+            <a:ext cx="5734050" cy="1333500"/>
           </a:xfrm>
           <a:prstGeom prst="rect">
             <a:avLst/>
@@ -4799,122 +4993,6 @@
           <p:cNvPr id="2" name="Title 1">
             <a:extLst>
               <a:ext uri="{FF2B5EF4-FFF2-40B4-BE49-F238E27FC236}">
-                <a16:creationId xmlns:a16="http://schemas.microsoft.com/office/drawing/2014/main" id="{CC4D835D-01FE-4F47-93BC-992AA35659C0}"/>
-              </a:ext>
-            </a:extLst>
-          </p:cNvPr>
-          <p:cNvSpPr>
-            <a:spLocks noGrp="1"/>
-          </p:cNvSpPr>
-          <p:nvPr>
-            <p:ph type="title"/>
-          </p:nvPr>
-        </p:nvSpPr>
-        <p:spPr/>
-        <p:txBody>
-          <a:bodyPr/>
-          <a:lstStyle/>
-          <a:p>
-            <a:r>
-              <a:rPr lang="en-US" dirty="0"/>
-              <a:t>Machine Learning</a:t>
-            </a:r>
-          </a:p>
-        </p:txBody>
-      </p:sp>
-      <p:sp>
-        <p:nvSpPr>
-          <p:cNvPr id="3" name="Content Placeholder 2">
-            <a:extLst>
-              <a:ext uri="{FF2B5EF4-FFF2-40B4-BE49-F238E27FC236}">
-                <a16:creationId xmlns:a16="http://schemas.microsoft.com/office/drawing/2014/main" id="{42B5C384-3324-4FD7-9315-26118C35AC4B}"/>
-              </a:ext>
-            </a:extLst>
-          </p:cNvPr>
-          <p:cNvSpPr>
-            <a:spLocks noGrp="1"/>
-          </p:cNvSpPr>
-          <p:nvPr>
-            <p:ph idx="1"/>
-          </p:nvPr>
-        </p:nvSpPr>
-        <p:spPr/>
-        <p:txBody>
-          <a:bodyPr/>
-          <a:lstStyle/>
-          <a:p>
-            <a:r>
-              <a:rPr lang="en-US" dirty="0"/>
-              <a:t>Train-test split: 75%</a:t>
-            </a:r>
-          </a:p>
-        </p:txBody>
-      </p:sp>
-      <p:pic>
-        <p:nvPicPr>
-          <p:cNvPr id="6" name="Picture 5">
-            <a:extLst>
-              <a:ext uri="{FF2B5EF4-FFF2-40B4-BE49-F238E27FC236}">
-                <a16:creationId xmlns:a16="http://schemas.microsoft.com/office/drawing/2014/main" id="{8E5E0AA9-08BE-426F-A40A-91736291A528}"/>
-              </a:ext>
-            </a:extLst>
-          </p:cNvPr>
-          <p:cNvPicPr>
-            <a:picLocks noChangeAspect="1"/>
-          </p:cNvPicPr>
-          <p:nvPr/>
-        </p:nvPicPr>
-        <p:blipFill>
-          <a:blip r:embed="rId2"/>
-          <a:stretch>
-            <a:fillRect/>
-          </a:stretch>
-        </p:blipFill>
-        <p:spPr>
-          <a:xfrm>
-            <a:off x="1202919" y="3093720"/>
-            <a:ext cx="5305425" cy="3124200"/>
-          </a:xfrm>
-          <a:prstGeom prst="rect">
-            <a:avLst/>
-          </a:prstGeom>
-        </p:spPr>
-      </p:pic>
-    </p:spTree>
-    <p:extLst>
-      <p:ext uri="{BB962C8B-B14F-4D97-AF65-F5344CB8AC3E}">
-        <p14:creationId xmlns:p14="http://schemas.microsoft.com/office/powerpoint/2010/main" val="565836537"/>
-      </p:ext>
-    </p:extLst>
-  </p:cSld>
-  <p:clrMapOvr>
-    <a:masterClrMapping/>
-  </p:clrMapOvr>
-</p:sld>
-</file>
-
-<file path=ppt/slides/slide14.xml><?xml version="1.0" encoding="utf-8"?>
-<p:sld xmlns:a="http://schemas.openxmlformats.org/drawingml/2006/main" xmlns:r="http://schemas.openxmlformats.org/officeDocument/2006/relationships" xmlns:p="http://schemas.openxmlformats.org/presentationml/2006/main">
-  <p:cSld>
-    <p:spTree>
-      <p:nvGrpSpPr>
-        <p:cNvPr id="1" name=""/>
-        <p:cNvGrpSpPr/>
-        <p:nvPr/>
-      </p:nvGrpSpPr>
-      <p:grpSpPr>
-        <a:xfrm>
-          <a:off x="0" y="0"/>
-          <a:ext cx="0" cy="0"/>
-          <a:chOff x="0" y="0"/>
-          <a:chExt cx="0" cy="0"/>
-        </a:xfrm>
-      </p:grpSpPr>
-      <p:sp>
-        <p:nvSpPr>
-          <p:cNvPr id="2" name="Title 1">
-            <a:extLst>
-              <a:ext uri="{FF2B5EF4-FFF2-40B4-BE49-F238E27FC236}">
                 <a16:creationId xmlns:a16="http://schemas.microsoft.com/office/drawing/2014/main" id="{9A7EE4AB-4C50-41D9-B10D-7436AFC4A6C0}"/>
               </a:ext>
             </a:extLst>
@@ -4933,7 +5011,7 @@
           <a:p>
             <a:r>
               <a:rPr lang="en-US" dirty="0"/>
-              <a:t>Machine Learning</a:t>
+              <a:t>Test set</a:t>
             </a:r>
           </a:p>
         </p:txBody>
@@ -5132,7 +5210,13 @@
           <a:p>
             <a:r>
               <a:rPr lang="en-US" dirty="0"/>
-              <a:t>Predicted R square score: 0.865</a:t>
+              <a:t>Standard error: 0.379</a:t>
+            </a:r>
+          </a:p>
+          <a:p>
+            <a:r>
+              <a:rPr lang="en-US" dirty="0"/>
+              <a:t>Predicted R square score: 0.868</a:t>
             </a:r>
           </a:p>
         </p:txBody>
@@ -5210,7 +5294,7 @@
 </p:sld>
 </file>
 
-<file path=ppt/slides/slide15.xml><?xml version="1.0" encoding="utf-8"?>
+<file path=ppt/slides/slide14.xml><?xml version="1.0" encoding="utf-8"?>
 <p:sld xmlns:a="http://schemas.openxmlformats.org/drawingml/2006/main" xmlns:r="http://schemas.openxmlformats.org/officeDocument/2006/relationships" xmlns:p="http://schemas.openxmlformats.org/presentationml/2006/main">
   <p:cSld>
     <p:spTree>
@@ -5284,13 +5368,13 @@
           <a:p>
             <a:r>
               <a:rPr lang="en-US" dirty="0"/>
-              <a:t>After checking the linear regression assumptions and AIC, BIC scores, the best regression model was chosen as lm_selling_price_t3.</a:t>
+              <a:t>After checking the linear regression assumptions and AIC, BIC scores, the best regression model was chosen as train_lm4.</a:t>
             </a:r>
           </a:p>
           <a:p>
             <a:r>
               <a:rPr lang="en-US" dirty="0"/>
-              <a:t>The prediction with the model gives 0.865 of the predicted r square score to the test dataset.</a:t>
+              <a:t>The prediction with the model gives 0.868 of the predicted r square score to the test dataset.</a:t>
             </a:r>
           </a:p>
           <a:p>
@@ -5305,7 +5389,7 @@
           <a:p>
             <a:r>
               <a:rPr lang="en-US" dirty="0"/>
-              <a:t>Use different regression models such as </a:t>
+              <a:t>Using different regression models such as </a:t>
             </a:r>
             <a:r>
               <a:rPr lang="en-US" dirty="0" err="1"/>
@@ -5313,7 +5397,7 @@
             </a:r>
             <a:r>
               <a:rPr lang="en-US" dirty="0"/>
-              <a:t> and compare the result.</a:t>
+              <a:t> may conclude a better result</a:t>
             </a:r>
           </a:p>
           <a:p>
@@ -5340,7 +5424,7 @@
 </p:sld>
 </file>
 
-<file path=ppt/slides/slide16.xml><?xml version="1.0" encoding="utf-8"?>
+<file path=ppt/slides/slide15.xml><?xml version="1.0" encoding="utf-8"?>
 <p:sld xmlns:a="http://schemas.openxmlformats.org/drawingml/2006/main" xmlns:r="http://schemas.openxmlformats.org/officeDocument/2006/relationships" xmlns:p="http://schemas.openxmlformats.org/presentationml/2006/main">
   <p:cSld>
     <p:spTree>
@@ -5498,6 +5582,13 @@
             </a:r>
           </a:p>
           <a:p>
+            <a:pPr lvl="1"/>
+            <a:r>
+              <a:rPr lang="en-US" dirty="0"/>
+              <a:t>70% training set – 30% test set</a:t>
+            </a:r>
+          </a:p>
+          <a:p>
             <a:r>
               <a:rPr lang="en-US" dirty="0"/>
               <a:t>Language: R</a:t>
@@ -5507,15 +5598,6 @@
             <a:r>
               <a:rPr lang="en-US" dirty="0"/>
               <a:t>Method: Multiple Linear Regression</a:t>
-            </a:r>
-          </a:p>
-          <a:p>
-            <a:pPr marL="0" indent="0">
-              <a:buNone/>
-            </a:pPr>
-            <a:r>
-              <a:rPr lang="en-US" dirty="0"/>
-              <a:t>	      Machine Learning</a:t>
             </a:r>
           </a:p>
         </p:txBody>
@@ -5976,14 +6058,17 @@
           <a:p>
             <a:r>
               <a:rPr lang="en-US" dirty="0"/>
-              <a:t>Some rows are having values of out of range or NA</a:t>
+              <a:t>Some rows are outliers or NA</a:t>
             </a:r>
           </a:p>
           <a:p>
             <a:r>
               <a:rPr lang="en-US" dirty="0"/>
-              <a:t>DROPNA, PARSE NUMBER, FILTER, </a:t>
-            </a:r>
+              <a:t>After filtering, the observations become 8128 -&gt; 7885</a:t>
+            </a:r>
+          </a:p>
+          <a:p>
+            <a:endParaRPr lang="en-US" dirty="0"/>
           </a:p>
         </p:txBody>
       </p:sp>
@@ -6537,6 +6622,17 @@
               <a:t>Log of selling price vs other features</a:t>
             </a:r>
           </a:p>
+          <a:p>
+            <a:r>
+              <a:rPr lang="en-US" dirty="0"/>
+              <a:t>Graphs are available in </a:t>
+            </a:r>
+            <a:r>
+              <a:rPr lang="en-US" dirty="0" err="1"/>
+              <a:t>RShiny</a:t>
+            </a:r>
+            <a:endParaRPr lang="en-US" dirty="0"/>
+          </a:p>
         </p:txBody>
       </p:sp>
       <p:sp>
@@ -6589,7 +6685,7 @@
         </p:blipFill>
         <p:spPr>
           <a:xfrm>
-            <a:off x="547675" y="2815715"/>
+            <a:off x="547675" y="2996867"/>
             <a:ext cx="2222501" cy="1371600"/>
           </a:xfrm>
           <a:prstGeom prst="rect">
@@ -6619,7 +6715,7 @@
         </p:blipFill>
         <p:spPr>
           <a:xfrm>
-            <a:off x="2766073" y="2815715"/>
+            <a:off x="2766073" y="2996867"/>
             <a:ext cx="2222501" cy="1371600"/>
           </a:xfrm>
           <a:prstGeom prst="rect">
@@ -6649,7 +6745,7 @@
         </p:blipFill>
         <p:spPr>
           <a:xfrm>
-            <a:off x="4988574" y="2815715"/>
+            <a:off x="4988574" y="2996867"/>
             <a:ext cx="2222501" cy="1371600"/>
           </a:xfrm>
           <a:prstGeom prst="rect">
@@ -6679,7 +6775,7 @@
         </p:blipFill>
         <p:spPr>
           <a:xfrm>
-            <a:off x="7211075" y="2815715"/>
+            <a:off x="7211075" y="2996867"/>
             <a:ext cx="2222501" cy="1371600"/>
           </a:xfrm>
           <a:prstGeom prst="rect">
@@ -6709,7 +6805,7 @@
         </p:blipFill>
         <p:spPr>
           <a:xfrm>
-            <a:off x="9429473" y="2815715"/>
+            <a:off x="9429473" y="2996867"/>
             <a:ext cx="2222500" cy="1371600"/>
           </a:xfrm>
           <a:prstGeom prst="rect">
@@ -6739,7 +6835,7 @@
         </p:blipFill>
         <p:spPr>
           <a:xfrm>
-            <a:off x="547675" y="4220004"/>
+            <a:off x="547675" y="4401156"/>
             <a:ext cx="2222500" cy="1371600"/>
           </a:xfrm>
           <a:prstGeom prst="rect">
@@ -6769,7 +6865,7 @@
         </p:blipFill>
         <p:spPr>
           <a:xfrm>
-            <a:off x="2766074" y="4220004"/>
+            <a:off x="2766074" y="4401156"/>
             <a:ext cx="2222500" cy="1371600"/>
           </a:xfrm>
           <a:prstGeom prst="rect">
@@ -6799,7 +6895,7 @@
         </p:blipFill>
         <p:spPr>
           <a:xfrm>
-            <a:off x="4988575" y="4220004"/>
+            <a:off x="4988575" y="4401156"/>
             <a:ext cx="2222500" cy="1371600"/>
           </a:xfrm>
           <a:prstGeom prst="rect">
@@ -6829,7 +6925,7 @@
         </p:blipFill>
         <p:spPr>
           <a:xfrm>
-            <a:off x="7211075" y="4220004"/>
+            <a:off x="7211075" y="4401156"/>
             <a:ext cx="2222501" cy="1371600"/>
           </a:xfrm>
           <a:prstGeom prst="rect">
@@ -6859,7 +6955,7 @@
         </p:blipFill>
         <p:spPr>
           <a:xfrm>
-            <a:off x="9429472" y="4220004"/>
+            <a:off x="9429472" y="4401156"/>
             <a:ext cx="2222501" cy="1371600"/>
           </a:xfrm>
           <a:prstGeom prst="rect">
@@ -6902,7 +6998,7 @@
           <p:cNvPr id="2" name="Title 1">
             <a:extLst>
               <a:ext uri="{FF2B5EF4-FFF2-40B4-BE49-F238E27FC236}">
-                <a16:creationId xmlns:a16="http://schemas.microsoft.com/office/drawing/2014/main" id="{B761B4CC-EB25-4A2C-A204-01A6A35F279F}"/>
+                <a16:creationId xmlns:a16="http://schemas.microsoft.com/office/drawing/2014/main" id="{CC4D835D-01FE-4F47-93BC-992AA35659C0}"/>
               </a:ext>
             </a:extLst>
           </p:cNvPr>
@@ -6920,7 +7016,7 @@
           <a:p>
             <a:r>
               <a:rPr lang="en-US" dirty="0"/>
-              <a:t>Multiple Linear Regression</a:t>
+              <a:t>Multiple linear regression</a:t>
             </a:r>
           </a:p>
         </p:txBody>
@@ -6930,7 +7026,7 @@
           <p:cNvPr id="3" name="Content Placeholder 2">
             <a:extLst>
               <a:ext uri="{FF2B5EF4-FFF2-40B4-BE49-F238E27FC236}">
-                <a16:creationId xmlns:a16="http://schemas.microsoft.com/office/drawing/2014/main" id="{719A5CCC-F1D4-40F6-BF61-05B4A558A203}"/>
+                <a16:creationId xmlns:a16="http://schemas.microsoft.com/office/drawing/2014/main" id="{42B5C384-3324-4FD7-9315-26118C35AC4B}"/>
               </a:ext>
             </a:extLst>
           </p:cNvPr>
@@ -6947,24 +7043,28 @@
           <a:lstStyle/>
           <a:p>
             <a:r>
+              <a:rPr lang="en-US" dirty="0"/>
+              <a:t>Take a 70% train, 30% test set for Multiple Linear Regression</a:t>
+            </a:r>
+          </a:p>
+          <a:p>
+            <a:r>
+              <a:rPr lang="en-US" dirty="0"/>
+              <a:t>Perform </a:t>
+            </a:r>
+            <a:r>
               <a:rPr lang="en-US" dirty="0" err="1"/>
-              <a:t>Dummify</a:t>
+              <a:t>dummify</a:t>
             </a:r>
             <a:r>
               <a:rPr lang="en-US" dirty="0"/>
-              <a:t> categorical variables</a:t>
+              <a:t> for categorical variables in the test set</a:t>
             </a:r>
           </a:p>
           <a:p>
             <a:r>
               <a:rPr lang="en-US" dirty="0"/>
-              <a:t>Model 1: all variables</a:t>
-            </a:r>
-          </a:p>
-          <a:p>
-            <a:r>
-              <a:rPr lang="en-US" dirty="0"/>
-              <a:t>VIF</a:t>
+              <a:t>VIF scores for multicollinearity check</a:t>
             </a:r>
           </a:p>
         </p:txBody>
@@ -6974,7 +7074,7 @@
           <p:cNvPr id="5" name="Picture 4">
             <a:extLst>
               <a:ext uri="{FF2B5EF4-FFF2-40B4-BE49-F238E27FC236}">
-                <a16:creationId xmlns:a16="http://schemas.microsoft.com/office/drawing/2014/main" id="{7734D4BB-1D63-4FEC-8192-AAA654B94B15}"/>
+                <a16:creationId xmlns:a16="http://schemas.microsoft.com/office/drawing/2014/main" id="{C3F9E58F-61BB-4108-8AC8-942CCC710835}"/>
               </a:ext>
             </a:extLst>
           </p:cNvPr>
@@ -6983,16 +7083,15 @@
           </p:cNvPicPr>
           <p:nvPr/>
         </p:nvPicPr>
-        <p:blipFill>
+        <p:blipFill rotWithShape="1">
           <a:blip r:embed="rId2"/>
-          <a:stretch>
-            <a:fillRect/>
-          </a:stretch>
+          <a:srcRect r="50000" b="50000"/>
+          <a:stretch/>
         </p:blipFill>
         <p:spPr>
           <a:xfrm>
-            <a:off x="838200" y="3429000"/>
-            <a:ext cx="4691332" cy="2747963"/>
+            <a:off x="1202919" y="3429000"/>
+            <a:ext cx="4126639" cy="2788920"/>
           </a:xfrm>
           <a:prstGeom prst="rect">
             <a:avLst/>
@@ -7001,10 +7100,10 @@
       </p:pic>
       <p:pic>
         <p:nvPicPr>
-          <p:cNvPr id="7" name="Picture 6">
+          <p:cNvPr id="8" name="Picture 7">
             <a:extLst>
               <a:ext uri="{FF2B5EF4-FFF2-40B4-BE49-F238E27FC236}">
-                <a16:creationId xmlns:a16="http://schemas.microsoft.com/office/drawing/2014/main" id="{EA989278-D496-4501-84D4-53398FF23073}"/>
+                <a16:creationId xmlns:a16="http://schemas.microsoft.com/office/drawing/2014/main" id="{BD6D5182-0D14-444C-9CD6-525EE51D46B1}"/>
               </a:ext>
             </a:extLst>
           </p:cNvPr>
@@ -7021,8 +7120,8 @@
         </p:blipFill>
         <p:spPr>
           <a:xfrm>
-            <a:off x="6096000" y="3419146"/>
-            <a:ext cx="3764884" cy="2757817"/>
+            <a:off x="6096000" y="3429001"/>
+            <a:ext cx="2757932" cy="2788920"/>
           </a:xfrm>
           <a:prstGeom prst="rect">
             <a:avLst/>
@@ -7032,7 +7131,7 @@
     </p:spTree>
     <p:extLst>
       <p:ext uri="{BB962C8B-B14F-4D97-AF65-F5344CB8AC3E}">
-        <p14:creationId xmlns:p14="http://schemas.microsoft.com/office/powerpoint/2010/main" val="2463496334"/>
+        <p14:creationId xmlns:p14="http://schemas.microsoft.com/office/powerpoint/2010/main" val="1524411021"/>
       </p:ext>
     </p:extLst>
   </p:cSld>
@@ -7231,7 +7330,7 @@
           <a:p>
             <a:r>
               <a:rPr lang="en-US" dirty="0"/>
-              <a:t>Change fuel column for </a:t>
+              <a:t>Change </a:t>
             </a:r>
             <a:r>
               <a:rPr lang="en-US" dirty="0" err="1"/>
@@ -7239,23 +7338,24 @@
             </a:r>
             <a:r>
               <a:rPr lang="en-US" dirty="0"/>
-              <a:t>, DIESEL to CNG, as a result of high VIF score for the first model</a:t>
-            </a:r>
-          </a:p>
-          <a:p>
+              <a:t> for fuel variable as from DIESEL to CNG</a:t>
+            </a:r>
+          </a:p>
+          <a:p>
+            <a:pPr lvl="1"/>
             <a:r>
               <a:rPr lang="en-US" dirty="0"/>
-              <a:t>Model 1a: all variables</a:t>
+              <a:t>Since DIESEL has a big correlation with Petrol, replace it to CNG</a:t>
             </a:r>
           </a:p>
         </p:txBody>
       </p:sp>
       <p:pic>
         <p:nvPicPr>
-          <p:cNvPr id="9" name="Picture 8">
+          <p:cNvPr id="5" name="Picture 4">
             <a:extLst>
               <a:ext uri="{FF2B5EF4-FFF2-40B4-BE49-F238E27FC236}">
-                <a16:creationId xmlns:a16="http://schemas.microsoft.com/office/drawing/2014/main" id="{8BB10034-C14C-40B0-9FAE-A7155923AF18}"/>
+                <a16:creationId xmlns:a16="http://schemas.microsoft.com/office/drawing/2014/main" id="{BC8CA503-BF9E-4585-B8E6-F629E587132C}"/>
               </a:ext>
             </a:extLst>
           </p:cNvPr>
@@ -7264,16 +7364,15 @@
           </p:cNvPicPr>
           <p:nvPr/>
         </p:nvPicPr>
-        <p:blipFill>
+        <p:blipFill rotWithShape="1">
           <a:blip r:embed="rId2"/>
-          <a:stretch>
-            <a:fillRect/>
-          </a:stretch>
+          <a:srcRect r="50000" b="50000"/>
+          <a:stretch/>
         </p:blipFill>
         <p:spPr>
           <a:xfrm>
-            <a:off x="6408770" y="3325089"/>
-            <a:ext cx="4130174" cy="2892829"/>
+            <a:off x="1202918" y="3325089"/>
+            <a:ext cx="4280389" cy="2892829"/>
           </a:xfrm>
           <a:prstGeom prst="rect">
             <a:avLst/>
@@ -7282,10 +7381,10 @@
       </p:pic>
       <p:pic>
         <p:nvPicPr>
-          <p:cNvPr id="11" name="Picture 10">
+          <p:cNvPr id="7" name="Picture 6">
             <a:extLst>
               <a:ext uri="{FF2B5EF4-FFF2-40B4-BE49-F238E27FC236}">
-                <a16:creationId xmlns:a16="http://schemas.microsoft.com/office/drawing/2014/main" id="{2C064A19-5CD5-438E-BD13-075B51F878CD}"/>
+                <a16:creationId xmlns:a16="http://schemas.microsoft.com/office/drawing/2014/main" id="{7C6D079B-CBFC-437D-82F8-2BC58C5AC102}"/>
               </a:ext>
             </a:extLst>
           </p:cNvPr>
@@ -7302,8 +7401,8 @@
         </p:blipFill>
         <p:spPr>
           <a:xfrm>
-            <a:off x="1202919" y="3325090"/>
-            <a:ext cx="4580313" cy="2892829"/>
+            <a:off x="6094959" y="3325089"/>
+            <a:ext cx="2583308" cy="2892829"/>
           </a:xfrm>
           <a:prstGeom prst="rect">
             <a:avLst/>

</xml_diff>